<commit_message>
Removed google forms link
</commit_message>
<xml_diff>
--- a/lectures/DSI_Sampling_2_Probability101.pptx
+++ b/lectures/DSI_Sampling_2_Probability101.pptx
@@ -246,7 +246,7 @@
           <a:p>
             <a:fld id="{BF566727-9F67-43B3-B1C8-DCF7E2E0765B}" type="datetimeFigureOut">
               <a:rPr lang="en-CA" smtClean="0"/>
-              <a:t>2024-03-22</a:t>
+              <a:t>2024-03-25</a:t>
             </a:fld>
             <a:endParaRPr lang="en-CA"/>
           </a:p>
@@ -6158,7 +6158,7 @@
           <a:p>
             <a:fld id="{6D9B8515-5BD7-4FBE-93F7-A341E37B546B}" type="datetimeFigureOut">
               <a:rPr lang="en-CA" smtClean="0"/>
-              <a:t>2024-03-22</a:t>
+              <a:t>2024-03-25</a:t>
             </a:fld>
             <a:endParaRPr lang="en-CA"/>
           </a:p>
@@ -6358,7 +6358,7 @@
           <a:p>
             <a:fld id="{6D9B8515-5BD7-4FBE-93F7-A341E37B546B}" type="datetimeFigureOut">
               <a:rPr lang="en-CA" smtClean="0"/>
-              <a:t>2024-03-22</a:t>
+              <a:t>2024-03-25</a:t>
             </a:fld>
             <a:endParaRPr lang="en-CA"/>
           </a:p>
@@ -6568,7 +6568,7 @@
           <a:p>
             <a:fld id="{6D9B8515-5BD7-4FBE-93F7-A341E37B546B}" type="datetimeFigureOut">
               <a:rPr lang="en-CA" smtClean="0"/>
-              <a:t>2024-03-22</a:t>
+              <a:t>2024-03-25</a:t>
             </a:fld>
             <a:endParaRPr lang="en-CA"/>
           </a:p>
@@ -7127,7 +7127,7 @@
           <a:p>
             <a:fld id="{6D9B8515-5BD7-4FBE-93F7-A341E37B546B}" type="datetimeFigureOut">
               <a:rPr lang="en-CA" smtClean="0"/>
-              <a:t>2024-03-22</a:t>
+              <a:t>2024-03-25</a:t>
             </a:fld>
             <a:endParaRPr lang="en-CA"/>
           </a:p>
@@ -7403,7 +7403,7 @@
           <a:p>
             <a:fld id="{6D9B8515-5BD7-4FBE-93F7-A341E37B546B}" type="datetimeFigureOut">
               <a:rPr lang="en-CA" smtClean="0"/>
-              <a:t>2024-03-22</a:t>
+              <a:t>2024-03-25</a:t>
             </a:fld>
             <a:endParaRPr lang="en-CA"/>
           </a:p>
@@ -7671,7 +7671,7 @@
           <a:p>
             <a:fld id="{6D9B8515-5BD7-4FBE-93F7-A341E37B546B}" type="datetimeFigureOut">
               <a:rPr lang="en-CA" smtClean="0"/>
-              <a:t>2024-03-22</a:t>
+              <a:t>2024-03-25</a:t>
             </a:fld>
             <a:endParaRPr lang="en-CA"/>
           </a:p>
@@ -8086,7 +8086,7 @@
           <a:p>
             <a:fld id="{6D9B8515-5BD7-4FBE-93F7-A341E37B546B}" type="datetimeFigureOut">
               <a:rPr lang="en-CA" smtClean="0"/>
-              <a:t>2024-03-22</a:t>
+              <a:t>2024-03-25</a:t>
             </a:fld>
             <a:endParaRPr lang="en-CA"/>
           </a:p>
@@ -8228,7 +8228,7 @@
           <a:p>
             <a:fld id="{6D9B8515-5BD7-4FBE-93F7-A341E37B546B}" type="datetimeFigureOut">
               <a:rPr lang="en-CA" smtClean="0"/>
-              <a:t>2024-03-22</a:t>
+              <a:t>2024-03-25</a:t>
             </a:fld>
             <a:endParaRPr lang="en-CA"/>
           </a:p>
@@ -8341,7 +8341,7 @@
           <a:p>
             <a:fld id="{6D9B8515-5BD7-4FBE-93F7-A341E37B546B}" type="datetimeFigureOut">
               <a:rPr lang="en-CA" smtClean="0"/>
-              <a:t>2024-03-22</a:t>
+              <a:t>2024-03-25</a:t>
             </a:fld>
             <a:endParaRPr lang="en-CA"/>
           </a:p>
@@ -8654,7 +8654,7 @@
           <a:p>
             <a:fld id="{6D9B8515-5BD7-4FBE-93F7-A341E37B546B}" type="datetimeFigureOut">
               <a:rPr lang="en-CA" smtClean="0"/>
-              <a:t>2024-03-22</a:t>
+              <a:t>2024-03-25</a:t>
             </a:fld>
             <a:endParaRPr lang="en-CA"/>
           </a:p>
@@ -8943,7 +8943,7 @@
           <a:p>
             <a:fld id="{6D9B8515-5BD7-4FBE-93F7-A341E37B546B}" type="datetimeFigureOut">
               <a:rPr lang="en-CA" smtClean="0"/>
-              <a:t>2024-03-22</a:t>
+              <a:t>2024-03-25</a:t>
             </a:fld>
             <a:endParaRPr lang="en-CA"/>
           </a:p>
@@ -9186,7 +9186,7 @@
           <a:p>
             <a:fld id="{6D9B8515-5BD7-4FBE-93F7-A341E37B546B}" type="datetimeFigureOut">
               <a:rPr lang="en-CA" smtClean="0"/>
-              <a:t>2024-03-22</a:t>
+              <a:t>2024-03-25</a:t>
             </a:fld>
             <a:endParaRPr lang="en-CA"/>
           </a:p>
@@ -12629,7 +12629,7 @@
                 <a:cs typeface="Fira Sans Condensed"/>
                 <a:sym typeface="Fira Sans Condensed"/>
               </a:rPr>
-              <a:t>Today, we will...</a:t>
+              <a:t>We will...</a:t>
             </a:r>
             <a:endParaRPr b="1" dirty="0">
               <a:latin typeface="Fira Sans Condensed"/>

</xml_diff>